<commit_message>
left panel button now give width of left-info-pnl to right-info-pnl, started new pause at functions
</commit_message>
<xml_diff>
--- a/images/Avida-ED-Eco-Buttons.pptx
+++ b/images/Avida-ED-Eco-Buttons.pptx
@@ -6,6 +6,7 @@
   </p:sldMasterIdLst>
   <p:sldIdLst>
     <p:sldId id="256" r:id="rId2"/>
+    <p:sldId id="257" r:id="rId3"/>
   </p:sldIdLst>
   <p:sldSz cx="12192000" cy="6858000"/>
   <p:notesSz cx="6858000" cy="9144000"/>
@@ -104,6 +105,11 @@
       </a:defRPr>
     </a:lvl9pPr>
   </p:defaultTextStyle>
+  <p:extLst>
+    <p:ext uri="{EFAFB233-063F-42B5-8137-9DF3F51BA10A}">
+      <p15:sldGuideLst xmlns:p15="http://schemas.microsoft.com/office/powerpoint/2012/main"/>
+    </p:ext>
+  </p:extLst>
 </p:presentation>
 </file>
 
@@ -254,7 +260,7 @@
           <a:p>
             <a:fld id="{539E7138-453D-4C4E-88B7-04960B6D404A}" type="datetimeFigureOut">
               <a:rPr lang="en-US" smtClean="0"/>
-              <a:t>8/17/18</a:t>
+              <a:t>3/6/21</a:t>
             </a:fld>
             <a:endParaRPr lang="en-US"/>
           </a:p>
@@ -452,7 +458,7 @@
           <a:p>
             <a:fld id="{539E7138-453D-4C4E-88B7-04960B6D404A}" type="datetimeFigureOut">
               <a:rPr lang="en-US" smtClean="0"/>
-              <a:t>8/17/18</a:t>
+              <a:t>3/6/21</a:t>
             </a:fld>
             <a:endParaRPr lang="en-US"/>
           </a:p>
@@ -660,7 +666,7 @@
           <a:p>
             <a:fld id="{539E7138-453D-4C4E-88B7-04960B6D404A}" type="datetimeFigureOut">
               <a:rPr lang="en-US" smtClean="0"/>
-              <a:t>8/17/18</a:t>
+              <a:t>3/6/21</a:t>
             </a:fld>
             <a:endParaRPr lang="en-US"/>
           </a:p>
@@ -858,7 +864,7 @@
           <a:p>
             <a:fld id="{539E7138-453D-4C4E-88B7-04960B6D404A}" type="datetimeFigureOut">
               <a:rPr lang="en-US" smtClean="0"/>
-              <a:t>8/17/18</a:t>
+              <a:t>3/6/21</a:t>
             </a:fld>
             <a:endParaRPr lang="en-US"/>
           </a:p>
@@ -1133,7 +1139,7 @@
           <a:p>
             <a:fld id="{539E7138-453D-4C4E-88B7-04960B6D404A}" type="datetimeFigureOut">
               <a:rPr lang="en-US" smtClean="0"/>
-              <a:t>8/17/18</a:t>
+              <a:t>3/6/21</a:t>
             </a:fld>
             <a:endParaRPr lang="en-US"/>
           </a:p>
@@ -1398,7 +1404,7 @@
           <a:p>
             <a:fld id="{539E7138-453D-4C4E-88B7-04960B6D404A}" type="datetimeFigureOut">
               <a:rPr lang="en-US" smtClean="0"/>
-              <a:t>8/17/18</a:t>
+              <a:t>3/6/21</a:t>
             </a:fld>
             <a:endParaRPr lang="en-US"/>
           </a:p>
@@ -1810,7 +1816,7 @@
           <a:p>
             <a:fld id="{539E7138-453D-4C4E-88B7-04960B6D404A}" type="datetimeFigureOut">
               <a:rPr lang="en-US" smtClean="0"/>
-              <a:t>8/17/18</a:t>
+              <a:t>3/6/21</a:t>
             </a:fld>
             <a:endParaRPr lang="en-US"/>
           </a:p>
@@ -1951,7 +1957,7 @@
           <a:p>
             <a:fld id="{539E7138-453D-4C4E-88B7-04960B6D404A}" type="datetimeFigureOut">
               <a:rPr lang="en-US" smtClean="0"/>
-              <a:t>8/17/18</a:t>
+              <a:t>3/6/21</a:t>
             </a:fld>
             <a:endParaRPr lang="en-US"/>
           </a:p>
@@ -2064,7 +2070,7 @@
           <a:p>
             <a:fld id="{539E7138-453D-4C4E-88B7-04960B6D404A}" type="datetimeFigureOut">
               <a:rPr lang="en-US" smtClean="0"/>
-              <a:t>8/17/18</a:t>
+              <a:t>3/6/21</a:t>
             </a:fld>
             <a:endParaRPr lang="en-US"/>
           </a:p>
@@ -2375,7 +2381,7 @@
           <a:p>
             <a:fld id="{539E7138-453D-4C4E-88B7-04960B6D404A}" type="datetimeFigureOut">
               <a:rPr lang="en-US" smtClean="0"/>
-              <a:t>8/17/18</a:t>
+              <a:t>3/6/21</a:t>
             </a:fld>
             <a:endParaRPr lang="en-US"/>
           </a:p>
@@ -2663,7 +2669,7 @@
           <a:p>
             <a:fld id="{539E7138-453D-4C4E-88B7-04960B6D404A}" type="datetimeFigureOut">
               <a:rPr lang="en-US" smtClean="0"/>
-              <a:t>8/17/18</a:t>
+              <a:t>3/6/21</a:t>
             </a:fld>
             <a:endParaRPr lang="en-US"/>
           </a:p>
@@ -2904,7 +2910,7 @@
           <a:p>
             <a:fld id="{539E7138-453D-4C4E-88B7-04960B6D404A}" type="datetimeFigureOut">
               <a:rPr lang="en-US" smtClean="0"/>
-              <a:t>8/17/18</a:t>
+              <a:t>3/6/21</a:t>
             </a:fld>
             <a:endParaRPr lang="en-US"/>
           </a:p>
@@ -3707,10 +3713,604 @@
           </p:style>
         </p:cxnSp>
       </p:grpSp>
+      <p:grpSp>
+        <p:nvGrpSpPr>
+          <p:cNvPr id="24" name="Group 23">
+            <a:extLst>
+              <a:ext uri="{FF2B5EF4-FFF2-40B4-BE49-F238E27FC236}">
+                <a16:creationId xmlns:a16="http://schemas.microsoft.com/office/drawing/2014/main" id="{A82F77FB-2B17-7447-9844-47ABA5DED3F1}"/>
+              </a:ext>
+            </a:extLst>
+          </p:cNvPr>
+          <p:cNvGrpSpPr/>
+          <p:nvPr/>
+        </p:nvGrpSpPr>
+        <p:grpSpPr>
+          <a:xfrm>
+            <a:off x="545950" y="4062078"/>
+            <a:ext cx="2745889" cy="1828800"/>
+            <a:chOff x="545950" y="4062078"/>
+            <a:chExt cx="2745889" cy="1828800"/>
+          </a:xfrm>
+        </p:grpSpPr>
+        <p:cxnSp>
+          <p:nvCxnSpPr>
+            <p:cNvPr id="19" name="Straight Connector 18">
+              <a:extLst>
+                <a:ext uri="{FF2B5EF4-FFF2-40B4-BE49-F238E27FC236}">
+                  <a16:creationId xmlns:a16="http://schemas.microsoft.com/office/drawing/2014/main" id="{4C728447-5E9E-A24D-9298-71579EEFCB63}"/>
+                </a:ext>
+              </a:extLst>
+            </p:cNvPr>
+            <p:cNvCxnSpPr>
+              <a:cxnSpLocks/>
+            </p:cNvCxnSpPr>
+            <p:nvPr/>
+          </p:nvCxnSpPr>
+          <p:spPr>
+            <a:xfrm flipH="1">
+              <a:off x="738522" y="4265066"/>
+              <a:ext cx="0" cy="1514267"/>
+            </a:xfrm>
+            <a:prstGeom prst="line">
+              <a:avLst/>
+            </a:prstGeom>
+            <a:ln w="63500" cap="rnd">
+              <a:solidFill>
+                <a:schemeClr val="tx1"/>
+              </a:solidFill>
+            </a:ln>
+          </p:spPr>
+          <p:style>
+            <a:lnRef idx="1">
+              <a:schemeClr val="accent1"/>
+            </a:lnRef>
+            <a:fillRef idx="0">
+              <a:schemeClr val="accent1"/>
+            </a:fillRef>
+            <a:effectRef idx="0">
+              <a:schemeClr val="accent1"/>
+            </a:effectRef>
+            <a:fontRef idx="minor">
+              <a:schemeClr val="tx1"/>
+            </a:fontRef>
+          </p:style>
+        </p:cxnSp>
+        <p:cxnSp>
+          <p:nvCxnSpPr>
+            <p:cNvPr id="20" name="Straight Connector 19">
+              <a:extLst>
+                <a:ext uri="{FF2B5EF4-FFF2-40B4-BE49-F238E27FC236}">
+                  <a16:creationId xmlns:a16="http://schemas.microsoft.com/office/drawing/2014/main" id="{F6A19AED-C07F-484D-A8D3-4BE3EC6A2AD8}"/>
+                </a:ext>
+              </a:extLst>
+            </p:cNvPr>
+            <p:cNvCxnSpPr>
+              <a:cxnSpLocks/>
+            </p:cNvCxnSpPr>
+            <p:nvPr/>
+          </p:nvCxnSpPr>
+          <p:spPr>
+            <a:xfrm flipH="1">
+              <a:off x="975005" y="4265066"/>
+              <a:ext cx="0" cy="1514267"/>
+            </a:xfrm>
+            <a:prstGeom prst="line">
+              <a:avLst/>
+            </a:prstGeom>
+            <a:ln w="63500" cap="rnd">
+              <a:solidFill>
+                <a:schemeClr val="tx1"/>
+              </a:solidFill>
+            </a:ln>
+          </p:spPr>
+          <p:style>
+            <a:lnRef idx="1">
+              <a:schemeClr val="accent1"/>
+            </a:lnRef>
+            <a:fillRef idx="0">
+              <a:schemeClr val="accent1"/>
+            </a:fillRef>
+            <a:effectRef idx="0">
+              <a:schemeClr val="accent1"/>
+            </a:effectRef>
+            <a:fontRef idx="minor">
+              <a:schemeClr val="tx1"/>
+            </a:fontRef>
+          </p:style>
+        </p:cxnSp>
+        <p:cxnSp>
+          <p:nvCxnSpPr>
+            <p:cNvPr id="3" name="Straight Connector 2">
+              <a:extLst>
+                <a:ext uri="{FF2B5EF4-FFF2-40B4-BE49-F238E27FC236}">
+                  <a16:creationId xmlns:a16="http://schemas.microsoft.com/office/drawing/2014/main" id="{16223889-B028-A74D-90D7-DC4D7EC7783D}"/>
+                </a:ext>
+              </a:extLst>
+            </p:cNvPr>
+            <p:cNvCxnSpPr>
+              <a:cxnSpLocks/>
+            </p:cNvCxnSpPr>
+            <p:nvPr/>
+          </p:nvCxnSpPr>
+          <p:spPr>
+            <a:xfrm>
+              <a:off x="545950" y="4062079"/>
+              <a:ext cx="2745889" cy="0"/>
+            </a:xfrm>
+            <a:prstGeom prst="line">
+              <a:avLst/>
+            </a:prstGeom>
+            <a:ln w="63500" cap="rnd">
+              <a:solidFill>
+                <a:schemeClr val="tx1"/>
+              </a:solidFill>
+            </a:ln>
+          </p:spPr>
+          <p:style>
+            <a:lnRef idx="1">
+              <a:schemeClr val="accent1"/>
+            </a:lnRef>
+            <a:fillRef idx="0">
+              <a:schemeClr val="accent1"/>
+            </a:fillRef>
+            <a:effectRef idx="0">
+              <a:schemeClr val="accent1"/>
+            </a:effectRef>
+            <a:fontRef idx="minor">
+              <a:schemeClr val="tx1"/>
+            </a:fontRef>
+          </p:style>
+        </p:cxnSp>
+        <p:cxnSp>
+          <p:nvCxnSpPr>
+            <p:cNvPr id="21" name="Straight Connector 20">
+              <a:extLst>
+                <a:ext uri="{FF2B5EF4-FFF2-40B4-BE49-F238E27FC236}">
+                  <a16:creationId xmlns:a16="http://schemas.microsoft.com/office/drawing/2014/main" id="{69A8935C-4092-C14A-AD92-95932D7835A5}"/>
+                </a:ext>
+              </a:extLst>
+            </p:cNvPr>
+            <p:cNvCxnSpPr>
+              <a:cxnSpLocks/>
+            </p:cNvCxnSpPr>
+            <p:nvPr/>
+          </p:nvCxnSpPr>
+          <p:spPr>
+            <a:xfrm>
+              <a:off x="545950" y="5890878"/>
+              <a:ext cx="2745889" cy="0"/>
+            </a:xfrm>
+            <a:prstGeom prst="line">
+              <a:avLst/>
+            </a:prstGeom>
+            <a:ln w="63500" cap="rnd">
+              <a:solidFill>
+                <a:schemeClr val="tx1"/>
+              </a:solidFill>
+            </a:ln>
+          </p:spPr>
+          <p:style>
+            <a:lnRef idx="1">
+              <a:schemeClr val="accent1"/>
+            </a:lnRef>
+            <a:fillRef idx="0">
+              <a:schemeClr val="accent1"/>
+            </a:fillRef>
+            <a:effectRef idx="0">
+              <a:schemeClr val="accent1"/>
+            </a:effectRef>
+            <a:fontRef idx="minor">
+              <a:schemeClr val="tx1"/>
+            </a:fontRef>
+          </p:style>
+        </p:cxnSp>
+        <p:cxnSp>
+          <p:nvCxnSpPr>
+            <p:cNvPr id="22" name="Straight Connector 21">
+              <a:extLst>
+                <a:ext uri="{FF2B5EF4-FFF2-40B4-BE49-F238E27FC236}">
+                  <a16:creationId xmlns:a16="http://schemas.microsoft.com/office/drawing/2014/main" id="{30AA550A-4B1C-0F42-8676-149FFF904167}"/>
+                </a:ext>
+              </a:extLst>
+            </p:cNvPr>
+            <p:cNvCxnSpPr>
+              <a:cxnSpLocks/>
+            </p:cNvCxnSpPr>
+            <p:nvPr/>
+          </p:nvCxnSpPr>
+          <p:spPr>
+            <a:xfrm flipV="1">
+              <a:off x="3291838" y="4062078"/>
+              <a:ext cx="1" cy="1828800"/>
+            </a:xfrm>
+            <a:prstGeom prst="line">
+              <a:avLst/>
+            </a:prstGeom>
+            <a:ln w="63500" cap="rnd">
+              <a:solidFill>
+                <a:schemeClr val="tx1"/>
+              </a:solidFill>
+              <a:bevel/>
+            </a:ln>
+          </p:spPr>
+          <p:style>
+            <a:lnRef idx="1">
+              <a:schemeClr val="accent1"/>
+            </a:lnRef>
+            <a:fillRef idx="0">
+              <a:schemeClr val="accent1"/>
+            </a:fillRef>
+            <a:effectRef idx="0">
+              <a:schemeClr val="accent1"/>
+            </a:effectRef>
+            <a:fontRef idx="minor">
+              <a:schemeClr val="tx1"/>
+            </a:fontRef>
+          </p:style>
+        </p:cxnSp>
+        <p:cxnSp>
+          <p:nvCxnSpPr>
+            <p:cNvPr id="23" name="Straight Connector 22">
+              <a:extLst>
+                <a:ext uri="{FF2B5EF4-FFF2-40B4-BE49-F238E27FC236}">
+                  <a16:creationId xmlns:a16="http://schemas.microsoft.com/office/drawing/2014/main" id="{B81C908E-5201-D342-9038-E78B630DD5CD}"/>
+                </a:ext>
+              </a:extLst>
+            </p:cNvPr>
+            <p:cNvCxnSpPr>
+              <a:cxnSpLocks/>
+            </p:cNvCxnSpPr>
+            <p:nvPr/>
+          </p:nvCxnSpPr>
+          <p:spPr>
+            <a:xfrm flipV="1">
+              <a:off x="545950" y="4062078"/>
+              <a:ext cx="1" cy="1828800"/>
+            </a:xfrm>
+            <a:prstGeom prst="line">
+              <a:avLst/>
+            </a:prstGeom>
+            <a:ln w="63500" cap="rnd">
+              <a:solidFill>
+                <a:schemeClr val="tx1"/>
+              </a:solidFill>
+            </a:ln>
+          </p:spPr>
+          <p:style>
+            <a:lnRef idx="1">
+              <a:schemeClr val="accent1"/>
+            </a:lnRef>
+            <a:fillRef idx="0">
+              <a:schemeClr val="accent1"/>
+            </a:fillRef>
+            <a:effectRef idx="0">
+              <a:schemeClr val="accent1"/>
+            </a:effectRef>
+            <a:fontRef idx="minor">
+              <a:schemeClr val="tx1"/>
+            </a:fontRef>
+          </p:style>
+        </p:cxnSp>
+      </p:grpSp>
     </p:spTree>
     <p:extLst>
       <p:ext uri="{BB962C8B-B14F-4D97-AF65-F5344CB8AC3E}">
         <p14:creationId xmlns:p14="http://schemas.microsoft.com/office/powerpoint/2010/main" val="1156944680"/>
+      </p:ext>
+    </p:extLst>
+  </p:cSld>
+  <p:clrMapOvr>
+    <a:masterClrMapping/>
+  </p:clrMapOvr>
+</p:sld>
+</file>
+
+<file path=ppt/slides/slide2.xml><?xml version="1.0" encoding="utf-8"?>
+<p:sld xmlns:a="http://schemas.openxmlformats.org/drawingml/2006/main" xmlns:r="http://schemas.openxmlformats.org/officeDocument/2006/relationships" xmlns:p="http://schemas.openxmlformats.org/presentationml/2006/main">
+  <p:cSld>
+    <p:spTree>
+      <p:nvGrpSpPr>
+        <p:cNvPr id="1" name=""/>
+        <p:cNvGrpSpPr/>
+        <p:nvPr/>
+      </p:nvGrpSpPr>
+      <p:grpSpPr>
+        <a:xfrm>
+          <a:off x="0" y="0"/>
+          <a:ext cx="0" cy="0"/>
+          <a:chOff x="0" y="0"/>
+          <a:chExt cx="0" cy="0"/>
+        </a:xfrm>
+      </p:grpSpPr>
+      <p:sp>
+        <p:nvSpPr>
+          <p:cNvPr id="2" name="Title 1">
+            <a:extLst>
+              <a:ext uri="{FF2B5EF4-FFF2-40B4-BE49-F238E27FC236}">
+                <a16:creationId xmlns:a16="http://schemas.microsoft.com/office/drawing/2014/main" id="{A837A034-1FA2-3547-A1DF-F953FEA6B0A4}"/>
+              </a:ext>
+            </a:extLst>
+          </p:cNvPr>
+          <p:cNvSpPr>
+            <a:spLocks noGrp="1"/>
+          </p:cNvSpPr>
+          <p:nvPr>
+            <p:ph type="title"/>
+          </p:nvPr>
+        </p:nvSpPr>
+        <p:spPr/>
+        <p:txBody>
+          <a:bodyPr/>
+          <a:lstStyle/>
+          <a:p>
+            <a:endParaRPr lang="en-US"/>
+          </a:p>
+        </p:txBody>
+      </p:sp>
+      <p:cxnSp>
+        <p:nvCxnSpPr>
+          <p:cNvPr id="5" name="Straight Connector 4">
+            <a:extLst>
+              <a:ext uri="{FF2B5EF4-FFF2-40B4-BE49-F238E27FC236}">
+                <a16:creationId xmlns:a16="http://schemas.microsoft.com/office/drawing/2014/main" id="{A352D19A-5465-A743-ADBC-11DFDBDF08A5}"/>
+              </a:ext>
+            </a:extLst>
+          </p:cNvPr>
+          <p:cNvCxnSpPr>
+            <a:cxnSpLocks/>
+          </p:cNvCxnSpPr>
+          <p:nvPr/>
+        </p:nvCxnSpPr>
+        <p:spPr>
+          <a:xfrm flipH="1">
+            <a:off x="1004821" y="4156779"/>
+            <a:ext cx="0" cy="1514267"/>
+          </a:xfrm>
+          <a:prstGeom prst="line">
+            <a:avLst/>
+          </a:prstGeom>
+          <a:ln w="101600" cap="rnd">
+            <a:solidFill>
+              <a:schemeClr val="tx1"/>
+            </a:solidFill>
+          </a:ln>
+        </p:spPr>
+        <p:style>
+          <a:lnRef idx="1">
+            <a:schemeClr val="accent1"/>
+          </a:lnRef>
+          <a:fillRef idx="0">
+            <a:schemeClr val="accent1"/>
+          </a:fillRef>
+          <a:effectRef idx="0">
+            <a:schemeClr val="accent1"/>
+          </a:effectRef>
+          <a:fontRef idx="minor">
+            <a:schemeClr val="tx1"/>
+          </a:fontRef>
+        </p:style>
+      </p:cxnSp>
+      <p:cxnSp>
+        <p:nvCxnSpPr>
+          <p:cNvPr id="6" name="Straight Connector 5">
+            <a:extLst>
+              <a:ext uri="{FF2B5EF4-FFF2-40B4-BE49-F238E27FC236}">
+                <a16:creationId xmlns:a16="http://schemas.microsoft.com/office/drawing/2014/main" id="{AB9C4EE0-0164-6644-9329-4B8E20F9D3F3}"/>
+              </a:ext>
+            </a:extLst>
+          </p:cNvPr>
+          <p:cNvCxnSpPr>
+            <a:cxnSpLocks/>
+          </p:cNvCxnSpPr>
+          <p:nvPr/>
+        </p:nvCxnSpPr>
+        <p:spPr>
+          <a:xfrm flipH="1">
+            <a:off x="1465895" y="4156779"/>
+            <a:ext cx="0" cy="1514267"/>
+          </a:xfrm>
+          <a:prstGeom prst="line">
+            <a:avLst/>
+          </a:prstGeom>
+          <a:ln w="101600" cap="rnd">
+            <a:solidFill>
+              <a:schemeClr val="tx1"/>
+            </a:solidFill>
+          </a:ln>
+        </p:spPr>
+        <p:style>
+          <a:lnRef idx="1">
+            <a:schemeClr val="accent1"/>
+          </a:lnRef>
+          <a:fillRef idx="0">
+            <a:schemeClr val="accent1"/>
+          </a:fillRef>
+          <a:effectRef idx="0">
+            <a:schemeClr val="accent1"/>
+          </a:effectRef>
+          <a:fontRef idx="minor">
+            <a:schemeClr val="tx1"/>
+          </a:fontRef>
+        </p:style>
+      </p:cxnSp>
+      <p:cxnSp>
+        <p:nvCxnSpPr>
+          <p:cNvPr id="7" name="Straight Connector 6">
+            <a:extLst>
+              <a:ext uri="{FF2B5EF4-FFF2-40B4-BE49-F238E27FC236}">
+                <a16:creationId xmlns:a16="http://schemas.microsoft.com/office/drawing/2014/main" id="{3E3AB3E8-FD53-AE40-838D-E821E68BD82E}"/>
+              </a:ext>
+            </a:extLst>
+          </p:cNvPr>
+          <p:cNvCxnSpPr>
+            <a:cxnSpLocks/>
+          </p:cNvCxnSpPr>
+          <p:nvPr/>
+        </p:nvCxnSpPr>
+        <p:spPr>
+          <a:xfrm>
+            <a:off x="560388" y="3999515"/>
+            <a:ext cx="2745889" cy="0"/>
+          </a:xfrm>
+          <a:prstGeom prst="line">
+            <a:avLst/>
+          </a:prstGeom>
+          <a:ln w="63500" cap="rnd">
+            <a:solidFill>
+              <a:schemeClr val="tx1"/>
+            </a:solidFill>
+          </a:ln>
+        </p:spPr>
+        <p:style>
+          <a:lnRef idx="1">
+            <a:schemeClr val="accent1"/>
+          </a:lnRef>
+          <a:fillRef idx="0">
+            <a:schemeClr val="accent1"/>
+          </a:fillRef>
+          <a:effectRef idx="0">
+            <a:schemeClr val="accent1"/>
+          </a:effectRef>
+          <a:fontRef idx="minor">
+            <a:schemeClr val="tx1"/>
+          </a:fontRef>
+        </p:style>
+      </p:cxnSp>
+      <p:cxnSp>
+        <p:nvCxnSpPr>
+          <p:cNvPr id="8" name="Straight Connector 7">
+            <a:extLst>
+              <a:ext uri="{FF2B5EF4-FFF2-40B4-BE49-F238E27FC236}">
+                <a16:creationId xmlns:a16="http://schemas.microsoft.com/office/drawing/2014/main" id="{BC321845-6836-F74F-8609-F9B5191C7B4B}"/>
+              </a:ext>
+            </a:extLst>
+          </p:cNvPr>
+          <p:cNvCxnSpPr>
+            <a:cxnSpLocks/>
+          </p:cNvCxnSpPr>
+          <p:nvPr/>
+        </p:nvCxnSpPr>
+        <p:spPr>
+          <a:xfrm>
+            <a:off x="560388" y="5828314"/>
+            <a:ext cx="2745889" cy="0"/>
+          </a:xfrm>
+          <a:prstGeom prst="line">
+            <a:avLst/>
+          </a:prstGeom>
+          <a:ln w="63500" cap="rnd">
+            <a:solidFill>
+              <a:schemeClr val="tx1"/>
+            </a:solidFill>
+          </a:ln>
+        </p:spPr>
+        <p:style>
+          <a:lnRef idx="1">
+            <a:schemeClr val="accent1"/>
+          </a:lnRef>
+          <a:fillRef idx="0">
+            <a:schemeClr val="accent1"/>
+          </a:fillRef>
+          <a:effectRef idx="0">
+            <a:schemeClr val="accent1"/>
+          </a:effectRef>
+          <a:fontRef idx="minor">
+            <a:schemeClr val="tx1"/>
+          </a:fontRef>
+        </p:style>
+      </p:cxnSp>
+      <p:cxnSp>
+        <p:nvCxnSpPr>
+          <p:cNvPr id="9" name="Straight Connector 8">
+            <a:extLst>
+              <a:ext uri="{FF2B5EF4-FFF2-40B4-BE49-F238E27FC236}">
+                <a16:creationId xmlns:a16="http://schemas.microsoft.com/office/drawing/2014/main" id="{61712B53-CF29-DE4A-AEC0-58D5AC5F4B44}"/>
+              </a:ext>
+            </a:extLst>
+          </p:cNvPr>
+          <p:cNvCxnSpPr>
+            <a:cxnSpLocks/>
+          </p:cNvCxnSpPr>
+          <p:nvPr/>
+        </p:nvCxnSpPr>
+        <p:spPr>
+          <a:xfrm flipV="1">
+            <a:off x="3306276" y="3999514"/>
+            <a:ext cx="1" cy="1828800"/>
+          </a:xfrm>
+          <a:prstGeom prst="line">
+            <a:avLst/>
+          </a:prstGeom>
+          <a:ln w="63500" cap="rnd">
+            <a:solidFill>
+              <a:schemeClr val="tx1"/>
+            </a:solidFill>
+            <a:bevel/>
+          </a:ln>
+        </p:spPr>
+        <p:style>
+          <a:lnRef idx="1">
+            <a:schemeClr val="accent1"/>
+          </a:lnRef>
+          <a:fillRef idx="0">
+            <a:schemeClr val="accent1"/>
+          </a:fillRef>
+          <a:effectRef idx="0">
+            <a:schemeClr val="accent1"/>
+          </a:effectRef>
+          <a:fontRef idx="minor">
+            <a:schemeClr val="tx1"/>
+          </a:fontRef>
+        </p:style>
+      </p:cxnSp>
+      <p:cxnSp>
+        <p:nvCxnSpPr>
+          <p:cNvPr id="10" name="Straight Connector 9">
+            <a:extLst>
+              <a:ext uri="{FF2B5EF4-FFF2-40B4-BE49-F238E27FC236}">
+                <a16:creationId xmlns:a16="http://schemas.microsoft.com/office/drawing/2014/main" id="{0A9E5ED7-E73E-EF41-A118-6A572E6B80A3}"/>
+              </a:ext>
+            </a:extLst>
+          </p:cNvPr>
+          <p:cNvCxnSpPr>
+            <a:cxnSpLocks/>
+          </p:cNvCxnSpPr>
+          <p:nvPr/>
+        </p:nvCxnSpPr>
+        <p:spPr>
+          <a:xfrm flipV="1">
+            <a:off x="560387" y="3999514"/>
+            <a:ext cx="1" cy="1828800"/>
+          </a:xfrm>
+          <a:prstGeom prst="line">
+            <a:avLst/>
+          </a:prstGeom>
+          <a:ln w="63500" cap="rnd">
+            <a:solidFill>
+              <a:schemeClr val="tx1"/>
+            </a:solidFill>
+          </a:ln>
+        </p:spPr>
+        <p:style>
+          <a:lnRef idx="1">
+            <a:schemeClr val="accent1"/>
+          </a:lnRef>
+          <a:fillRef idx="0">
+            <a:schemeClr val="accent1"/>
+          </a:fillRef>
+          <a:effectRef idx="0">
+            <a:schemeClr val="accent1"/>
+          </a:effectRef>
+          <a:fontRef idx="minor">
+            <a:schemeClr val="tx1"/>
+          </a:fontRef>
+        </p:style>
+      </p:cxnSp>
+    </p:spTree>
+    <p:extLst>
+      <p:ext uri="{BB962C8B-B14F-4D97-AF65-F5344CB8AC3E}">
+        <p14:creationId xmlns:p14="http://schemas.microsoft.com/office/powerpoint/2010/main" val="1763134952"/>
       </p:ext>
     </p:extLst>
   </p:cSld>

</xml_diff>

<commit_message>
add files from av4ths since merge would not work
</commit_message>
<xml_diff>
--- a/images/Avida-ED-Eco-Buttons.pptx
+++ b/images/Avida-ED-Eco-Buttons.pptx
@@ -6,6 +6,7 @@
   </p:sldMasterIdLst>
   <p:sldIdLst>
     <p:sldId id="256" r:id="rId2"/>
+    <p:sldId id="257" r:id="rId3"/>
   </p:sldIdLst>
   <p:sldSz cx="12192000" cy="6858000"/>
   <p:notesSz cx="6858000" cy="9144000"/>
@@ -104,6 +105,11 @@
       </a:defRPr>
     </a:lvl9pPr>
   </p:defaultTextStyle>
+  <p:extLst>
+    <p:ext uri="{EFAFB233-063F-42B5-8137-9DF3F51BA10A}">
+      <p15:sldGuideLst xmlns:p15="http://schemas.microsoft.com/office/powerpoint/2012/main"/>
+    </p:ext>
+  </p:extLst>
 </p:presentation>
 </file>
 
@@ -254,7 +260,7 @@
           <a:p>
             <a:fld id="{539E7138-453D-4C4E-88B7-04960B6D404A}" type="datetimeFigureOut">
               <a:rPr lang="en-US" smtClean="0"/>
-              <a:t>8/17/18</a:t>
+              <a:t>3/6/21</a:t>
             </a:fld>
             <a:endParaRPr lang="en-US"/>
           </a:p>
@@ -452,7 +458,7 @@
           <a:p>
             <a:fld id="{539E7138-453D-4C4E-88B7-04960B6D404A}" type="datetimeFigureOut">
               <a:rPr lang="en-US" smtClean="0"/>
-              <a:t>8/17/18</a:t>
+              <a:t>3/6/21</a:t>
             </a:fld>
             <a:endParaRPr lang="en-US"/>
           </a:p>
@@ -660,7 +666,7 @@
           <a:p>
             <a:fld id="{539E7138-453D-4C4E-88B7-04960B6D404A}" type="datetimeFigureOut">
               <a:rPr lang="en-US" smtClean="0"/>
-              <a:t>8/17/18</a:t>
+              <a:t>3/6/21</a:t>
             </a:fld>
             <a:endParaRPr lang="en-US"/>
           </a:p>
@@ -858,7 +864,7 @@
           <a:p>
             <a:fld id="{539E7138-453D-4C4E-88B7-04960B6D404A}" type="datetimeFigureOut">
               <a:rPr lang="en-US" smtClean="0"/>
-              <a:t>8/17/18</a:t>
+              <a:t>3/6/21</a:t>
             </a:fld>
             <a:endParaRPr lang="en-US"/>
           </a:p>
@@ -1133,7 +1139,7 @@
           <a:p>
             <a:fld id="{539E7138-453D-4C4E-88B7-04960B6D404A}" type="datetimeFigureOut">
               <a:rPr lang="en-US" smtClean="0"/>
-              <a:t>8/17/18</a:t>
+              <a:t>3/6/21</a:t>
             </a:fld>
             <a:endParaRPr lang="en-US"/>
           </a:p>
@@ -1398,7 +1404,7 @@
           <a:p>
             <a:fld id="{539E7138-453D-4C4E-88B7-04960B6D404A}" type="datetimeFigureOut">
               <a:rPr lang="en-US" smtClean="0"/>
-              <a:t>8/17/18</a:t>
+              <a:t>3/6/21</a:t>
             </a:fld>
             <a:endParaRPr lang="en-US"/>
           </a:p>
@@ -1810,7 +1816,7 @@
           <a:p>
             <a:fld id="{539E7138-453D-4C4E-88B7-04960B6D404A}" type="datetimeFigureOut">
               <a:rPr lang="en-US" smtClean="0"/>
-              <a:t>8/17/18</a:t>
+              <a:t>3/6/21</a:t>
             </a:fld>
             <a:endParaRPr lang="en-US"/>
           </a:p>
@@ -1951,7 +1957,7 @@
           <a:p>
             <a:fld id="{539E7138-453D-4C4E-88B7-04960B6D404A}" type="datetimeFigureOut">
               <a:rPr lang="en-US" smtClean="0"/>
-              <a:t>8/17/18</a:t>
+              <a:t>3/6/21</a:t>
             </a:fld>
             <a:endParaRPr lang="en-US"/>
           </a:p>
@@ -2064,7 +2070,7 @@
           <a:p>
             <a:fld id="{539E7138-453D-4C4E-88B7-04960B6D404A}" type="datetimeFigureOut">
               <a:rPr lang="en-US" smtClean="0"/>
-              <a:t>8/17/18</a:t>
+              <a:t>3/6/21</a:t>
             </a:fld>
             <a:endParaRPr lang="en-US"/>
           </a:p>
@@ -2375,7 +2381,7 @@
           <a:p>
             <a:fld id="{539E7138-453D-4C4E-88B7-04960B6D404A}" type="datetimeFigureOut">
               <a:rPr lang="en-US" smtClean="0"/>
-              <a:t>8/17/18</a:t>
+              <a:t>3/6/21</a:t>
             </a:fld>
             <a:endParaRPr lang="en-US"/>
           </a:p>
@@ -2663,7 +2669,7 @@
           <a:p>
             <a:fld id="{539E7138-453D-4C4E-88B7-04960B6D404A}" type="datetimeFigureOut">
               <a:rPr lang="en-US" smtClean="0"/>
-              <a:t>8/17/18</a:t>
+              <a:t>3/6/21</a:t>
             </a:fld>
             <a:endParaRPr lang="en-US"/>
           </a:p>
@@ -2904,7 +2910,7 @@
           <a:p>
             <a:fld id="{539E7138-453D-4C4E-88B7-04960B6D404A}" type="datetimeFigureOut">
               <a:rPr lang="en-US" smtClean="0"/>
-              <a:t>8/17/18</a:t>
+              <a:t>3/6/21</a:t>
             </a:fld>
             <a:endParaRPr lang="en-US"/>
           </a:p>
@@ -3707,10 +3713,604 @@
           </p:style>
         </p:cxnSp>
       </p:grpSp>
+      <p:grpSp>
+        <p:nvGrpSpPr>
+          <p:cNvPr id="24" name="Group 23">
+            <a:extLst>
+              <a:ext uri="{FF2B5EF4-FFF2-40B4-BE49-F238E27FC236}">
+                <a16:creationId xmlns:a16="http://schemas.microsoft.com/office/drawing/2014/main" id="{A82F77FB-2B17-7447-9844-47ABA5DED3F1}"/>
+              </a:ext>
+            </a:extLst>
+          </p:cNvPr>
+          <p:cNvGrpSpPr/>
+          <p:nvPr/>
+        </p:nvGrpSpPr>
+        <p:grpSpPr>
+          <a:xfrm>
+            <a:off x="545950" y="4062078"/>
+            <a:ext cx="2745889" cy="1828800"/>
+            <a:chOff x="545950" y="4062078"/>
+            <a:chExt cx="2745889" cy="1828800"/>
+          </a:xfrm>
+        </p:grpSpPr>
+        <p:cxnSp>
+          <p:nvCxnSpPr>
+            <p:cNvPr id="19" name="Straight Connector 18">
+              <a:extLst>
+                <a:ext uri="{FF2B5EF4-FFF2-40B4-BE49-F238E27FC236}">
+                  <a16:creationId xmlns:a16="http://schemas.microsoft.com/office/drawing/2014/main" id="{4C728447-5E9E-A24D-9298-71579EEFCB63}"/>
+                </a:ext>
+              </a:extLst>
+            </p:cNvPr>
+            <p:cNvCxnSpPr>
+              <a:cxnSpLocks/>
+            </p:cNvCxnSpPr>
+            <p:nvPr/>
+          </p:nvCxnSpPr>
+          <p:spPr>
+            <a:xfrm flipH="1">
+              <a:off x="738522" y="4265066"/>
+              <a:ext cx="0" cy="1514267"/>
+            </a:xfrm>
+            <a:prstGeom prst="line">
+              <a:avLst/>
+            </a:prstGeom>
+            <a:ln w="63500" cap="rnd">
+              <a:solidFill>
+                <a:schemeClr val="tx1"/>
+              </a:solidFill>
+            </a:ln>
+          </p:spPr>
+          <p:style>
+            <a:lnRef idx="1">
+              <a:schemeClr val="accent1"/>
+            </a:lnRef>
+            <a:fillRef idx="0">
+              <a:schemeClr val="accent1"/>
+            </a:fillRef>
+            <a:effectRef idx="0">
+              <a:schemeClr val="accent1"/>
+            </a:effectRef>
+            <a:fontRef idx="minor">
+              <a:schemeClr val="tx1"/>
+            </a:fontRef>
+          </p:style>
+        </p:cxnSp>
+        <p:cxnSp>
+          <p:nvCxnSpPr>
+            <p:cNvPr id="20" name="Straight Connector 19">
+              <a:extLst>
+                <a:ext uri="{FF2B5EF4-FFF2-40B4-BE49-F238E27FC236}">
+                  <a16:creationId xmlns:a16="http://schemas.microsoft.com/office/drawing/2014/main" id="{F6A19AED-C07F-484D-A8D3-4BE3EC6A2AD8}"/>
+                </a:ext>
+              </a:extLst>
+            </p:cNvPr>
+            <p:cNvCxnSpPr>
+              <a:cxnSpLocks/>
+            </p:cNvCxnSpPr>
+            <p:nvPr/>
+          </p:nvCxnSpPr>
+          <p:spPr>
+            <a:xfrm flipH="1">
+              <a:off x="975005" y="4265066"/>
+              <a:ext cx="0" cy="1514267"/>
+            </a:xfrm>
+            <a:prstGeom prst="line">
+              <a:avLst/>
+            </a:prstGeom>
+            <a:ln w="63500" cap="rnd">
+              <a:solidFill>
+                <a:schemeClr val="tx1"/>
+              </a:solidFill>
+            </a:ln>
+          </p:spPr>
+          <p:style>
+            <a:lnRef idx="1">
+              <a:schemeClr val="accent1"/>
+            </a:lnRef>
+            <a:fillRef idx="0">
+              <a:schemeClr val="accent1"/>
+            </a:fillRef>
+            <a:effectRef idx="0">
+              <a:schemeClr val="accent1"/>
+            </a:effectRef>
+            <a:fontRef idx="minor">
+              <a:schemeClr val="tx1"/>
+            </a:fontRef>
+          </p:style>
+        </p:cxnSp>
+        <p:cxnSp>
+          <p:nvCxnSpPr>
+            <p:cNvPr id="3" name="Straight Connector 2">
+              <a:extLst>
+                <a:ext uri="{FF2B5EF4-FFF2-40B4-BE49-F238E27FC236}">
+                  <a16:creationId xmlns:a16="http://schemas.microsoft.com/office/drawing/2014/main" id="{16223889-B028-A74D-90D7-DC4D7EC7783D}"/>
+                </a:ext>
+              </a:extLst>
+            </p:cNvPr>
+            <p:cNvCxnSpPr>
+              <a:cxnSpLocks/>
+            </p:cNvCxnSpPr>
+            <p:nvPr/>
+          </p:nvCxnSpPr>
+          <p:spPr>
+            <a:xfrm>
+              <a:off x="545950" y="4062079"/>
+              <a:ext cx="2745889" cy="0"/>
+            </a:xfrm>
+            <a:prstGeom prst="line">
+              <a:avLst/>
+            </a:prstGeom>
+            <a:ln w="63500" cap="rnd">
+              <a:solidFill>
+                <a:schemeClr val="tx1"/>
+              </a:solidFill>
+            </a:ln>
+          </p:spPr>
+          <p:style>
+            <a:lnRef idx="1">
+              <a:schemeClr val="accent1"/>
+            </a:lnRef>
+            <a:fillRef idx="0">
+              <a:schemeClr val="accent1"/>
+            </a:fillRef>
+            <a:effectRef idx="0">
+              <a:schemeClr val="accent1"/>
+            </a:effectRef>
+            <a:fontRef idx="minor">
+              <a:schemeClr val="tx1"/>
+            </a:fontRef>
+          </p:style>
+        </p:cxnSp>
+        <p:cxnSp>
+          <p:nvCxnSpPr>
+            <p:cNvPr id="21" name="Straight Connector 20">
+              <a:extLst>
+                <a:ext uri="{FF2B5EF4-FFF2-40B4-BE49-F238E27FC236}">
+                  <a16:creationId xmlns:a16="http://schemas.microsoft.com/office/drawing/2014/main" id="{69A8935C-4092-C14A-AD92-95932D7835A5}"/>
+                </a:ext>
+              </a:extLst>
+            </p:cNvPr>
+            <p:cNvCxnSpPr>
+              <a:cxnSpLocks/>
+            </p:cNvCxnSpPr>
+            <p:nvPr/>
+          </p:nvCxnSpPr>
+          <p:spPr>
+            <a:xfrm>
+              <a:off x="545950" y="5890878"/>
+              <a:ext cx="2745889" cy="0"/>
+            </a:xfrm>
+            <a:prstGeom prst="line">
+              <a:avLst/>
+            </a:prstGeom>
+            <a:ln w="63500" cap="rnd">
+              <a:solidFill>
+                <a:schemeClr val="tx1"/>
+              </a:solidFill>
+            </a:ln>
+          </p:spPr>
+          <p:style>
+            <a:lnRef idx="1">
+              <a:schemeClr val="accent1"/>
+            </a:lnRef>
+            <a:fillRef idx="0">
+              <a:schemeClr val="accent1"/>
+            </a:fillRef>
+            <a:effectRef idx="0">
+              <a:schemeClr val="accent1"/>
+            </a:effectRef>
+            <a:fontRef idx="minor">
+              <a:schemeClr val="tx1"/>
+            </a:fontRef>
+          </p:style>
+        </p:cxnSp>
+        <p:cxnSp>
+          <p:nvCxnSpPr>
+            <p:cNvPr id="22" name="Straight Connector 21">
+              <a:extLst>
+                <a:ext uri="{FF2B5EF4-FFF2-40B4-BE49-F238E27FC236}">
+                  <a16:creationId xmlns:a16="http://schemas.microsoft.com/office/drawing/2014/main" id="{30AA550A-4B1C-0F42-8676-149FFF904167}"/>
+                </a:ext>
+              </a:extLst>
+            </p:cNvPr>
+            <p:cNvCxnSpPr>
+              <a:cxnSpLocks/>
+            </p:cNvCxnSpPr>
+            <p:nvPr/>
+          </p:nvCxnSpPr>
+          <p:spPr>
+            <a:xfrm flipV="1">
+              <a:off x="3291838" y="4062078"/>
+              <a:ext cx="1" cy="1828800"/>
+            </a:xfrm>
+            <a:prstGeom prst="line">
+              <a:avLst/>
+            </a:prstGeom>
+            <a:ln w="63500" cap="rnd">
+              <a:solidFill>
+                <a:schemeClr val="tx1"/>
+              </a:solidFill>
+              <a:bevel/>
+            </a:ln>
+          </p:spPr>
+          <p:style>
+            <a:lnRef idx="1">
+              <a:schemeClr val="accent1"/>
+            </a:lnRef>
+            <a:fillRef idx="0">
+              <a:schemeClr val="accent1"/>
+            </a:fillRef>
+            <a:effectRef idx="0">
+              <a:schemeClr val="accent1"/>
+            </a:effectRef>
+            <a:fontRef idx="minor">
+              <a:schemeClr val="tx1"/>
+            </a:fontRef>
+          </p:style>
+        </p:cxnSp>
+        <p:cxnSp>
+          <p:nvCxnSpPr>
+            <p:cNvPr id="23" name="Straight Connector 22">
+              <a:extLst>
+                <a:ext uri="{FF2B5EF4-FFF2-40B4-BE49-F238E27FC236}">
+                  <a16:creationId xmlns:a16="http://schemas.microsoft.com/office/drawing/2014/main" id="{B81C908E-5201-D342-9038-E78B630DD5CD}"/>
+                </a:ext>
+              </a:extLst>
+            </p:cNvPr>
+            <p:cNvCxnSpPr>
+              <a:cxnSpLocks/>
+            </p:cNvCxnSpPr>
+            <p:nvPr/>
+          </p:nvCxnSpPr>
+          <p:spPr>
+            <a:xfrm flipV="1">
+              <a:off x="545950" y="4062078"/>
+              <a:ext cx="1" cy="1828800"/>
+            </a:xfrm>
+            <a:prstGeom prst="line">
+              <a:avLst/>
+            </a:prstGeom>
+            <a:ln w="63500" cap="rnd">
+              <a:solidFill>
+                <a:schemeClr val="tx1"/>
+              </a:solidFill>
+            </a:ln>
+          </p:spPr>
+          <p:style>
+            <a:lnRef idx="1">
+              <a:schemeClr val="accent1"/>
+            </a:lnRef>
+            <a:fillRef idx="0">
+              <a:schemeClr val="accent1"/>
+            </a:fillRef>
+            <a:effectRef idx="0">
+              <a:schemeClr val="accent1"/>
+            </a:effectRef>
+            <a:fontRef idx="minor">
+              <a:schemeClr val="tx1"/>
+            </a:fontRef>
+          </p:style>
+        </p:cxnSp>
+      </p:grpSp>
     </p:spTree>
     <p:extLst>
       <p:ext uri="{BB962C8B-B14F-4D97-AF65-F5344CB8AC3E}">
         <p14:creationId xmlns:p14="http://schemas.microsoft.com/office/powerpoint/2010/main" val="1156944680"/>
+      </p:ext>
+    </p:extLst>
+  </p:cSld>
+  <p:clrMapOvr>
+    <a:masterClrMapping/>
+  </p:clrMapOvr>
+</p:sld>
+</file>
+
+<file path=ppt/slides/slide2.xml><?xml version="1.0" encoding="utf-8"?>
+<p:sld xmlns:a="http://schemas.openxmlformats.org/drawingml/2006/main" xmlns:r="http://schemas.openxmlformats.org/officeDocument/2006/relationships" xmlns:p="http://schemas.openxmlformats.org/presentationml/2006/main">
+  <p:cSld>
+    <p:spTree>
+      <p:nvGrpSpPr>
+        <p:cNvPr id="1" name=""/>
+        <p:cNvGrpSpPr/>
+        <p:nvPr/>
+      </p:nvGrpSpPr>
+      <p:grpSpPr>
+        <a:xfrm>
+          <a:off x="0" y="0"/>
+          <a:ext cx="0" cy="0"/>
+          <a:chOff x="0" y="0"/>
+          <a:chExt cx="0" cy="0"/>
+        </a:xfrm>
+      </p:grpSpPr>
+      <p:sp>
+        <p:nvSpPr>
+          <p:cNvPr id="2" name="Title 1">
+            <a:extLst>
+              <a:ext uri="{FF2B5EF4-FFF2-40B4-BE49-F238E27FC236}">
+                <a16:creationId xmlns:a16="http://schemas.microsoft.com/office/drawing/2014/main" id="{A837A034-1FA2-3547-A1DF-F953FEA6B0A4}"/>
+              </a:ext>
+            </a:extLst>
+          </p:cNvPr>
+          <p:cNvSpPr>
+            <a:spLocks noGrp="1"/>
+          </p:cNvSpPr>
+          <p:nvPr>
+            <p:ph type="title"/>
+          </p:nvPr>
+        </p:nvSpPr>
+        <p:spPr/>
+        <p:txBody>
+          <a:bodyPr/>
+          <a:lstStyle/>
+          <a:p>
+            <a:endParaRPr lang="en-US"/>
+          </a:p>
+        </p:txBody>
+      </p:sp>
+      <p:cxnSp>
+        <p:nvCxnSpPr>
+          <p:cNvPr id="5" name="Straight Connector 4">
+            <a:extLst>
+              <a:ext uri="{FF2B5EF4-FFF2-40B4-BE49-F238E27FC236}">
+                <a16:creationId xmlns:a16="http://schemas.microsoft.com/office/drawing/2014/main" id="{A352D19A-5465-A743-ADBC-11DFDBDF08A5}"/>
+              </a:ext>
+            </a:extLst>
+          </p:cNvPr>
+          <p:cNvCxnSpPr>
+            <a:cxnSpLocks/>
+          </p:cNvCxnSpPr>
+          <p:nvPr/>
+        </p:nvCxnSpPr>
+        <p:spPr>
+          <a:xfrm flipH="1">
+            <a:off x="1004821" y="4156779"/>
+            <a:ext cx="0" cy="1514267"/>
+          </a:xfrm>
+          <a:prstGeom prst="line">
+            <a:avLst/>
+          </a:prstGeom>
+          <a:ln w="101600" cap="rnd">
+            <a:solidFill>
+              <a:schemeClr val="tx1"/>
+            </a:solidFill>
+          </a:ln>
+        </p:spPr>
+        <p:style>
+          <a:lnRef idx="1">
+            <a:schemeClr val="accent1"/>
+          </a:lnRef>
+          <a:fillRef idx="0">
+            <a:schemeClr val="accent1"/>
+          </a:fillRef>
+          <a:effectRef idx="0">
+            <a:schemeClr val="accent1"/>
+          </a:effectRef>
+          <a:fontRef idx="minor">
+            <a:schemeClr val="tx1"/>
+          </a:fontRef>
+        </p:style>
+      </p:cxnSp>
+      <p:cxnSp>
+        <p:nvCxnSpPr>
+          <p:cNvPr id="6" name="Straight Connector 5">
+            <a:extLst>
+              <a:ext uri="{FF2B5EF4-FFF2-40B4-BE49-F238E27FC236}">
+                <a16:creationId xmlns:a16="http://schemas.microsoft.com/office/drawing/2014/main" id="{AB9C4EE0-0164-6644-9329-4B8E20F9D3F3}"/>
+              </a:ext>
+            </a:extLst>
+          </p:cNvPr>
+          <p:cNvCxnSpPr>
+            <a:cxnSpLocks/>
+          </p:cNvCxnSpPr>
+          <p:nvPr/>
+        </p:nvCxnSpPr>
+        <p:spPr>
+          <a:xfrm flipH="1">
+            <a:off x="1465895" y="4156779"/>
+            <a:ext cx="0" cy="1514267"/>
+          </a:xfrm>
+          <a:prstGeom prst="line">
+            <a:avLst/>
+          </a:prstGeom>
+          <a:ln w="101600" cap="rnd">
+            <a:solidFill>
+              <a:schemeClr val="tx1"/>
+            </a:solidFill>
+          </a:ln>
+        </p:spPr>
+        <p:style>
+          <a:lnRef idx="1">
+            <a:schemeClr val="accent1"/>
+          </a:lnRef>
+          <a:fillRef idx="0">
+            <a:schemeClr val="accent1"/>
+          </a:fillRef>
+          <a:effectRef idx="0">
+            <a:schemeClr val="accent1"/>
+          </a:effectRef>
+          <a:fontRef idx="minor">
+            <a:schemeClr val="tx1"/>
+          </a:fontRef>
+        </p:style>
+      </p:cxnSp>
+      <p:cxnSp>
+        <p:nvCxnSpPr>
+          <p:cNvPr id="7" name="Straight Connector 6">
+            <a:extLst>
+              <a:ext uri="{FF2B5EF4-FFF2-40B4-BE49-F238E27FC236}">
+                <a16:creationId xmlns:a16="http://schemas.microsoft.com/office/drawing/2014/main" id="{3E3AB3E8-FD53-AE40-838D-E821E68BD82E}"/>
+              </a:ext>
+            </a:extLst>
+          </p:cNvPr>
+          <p:cNvCxnSpPr>
+            <a:cxnSpLocks/>
+          </p:cNvCxnSpPr>
+          <p:nvPr/>
+        </p:nvCxnSpPr>
+        <p:spPr>
+          <a:xfrm>
+            <a:off x="560388" y="3999515"/>
+            <a:ext cx="2745889" cy="0"/>
+          </a:xfrm>
+          <a:prstGeom prst="line">
+            <a:avLst/>
+          </a:prstGeom>
+          <a:ln w="63500" cap="rnd">
+            <a:solidFill>
+              <a:schemeClr val="tx1"/>
+            </a:solidFill>
+          </a:ln>
+        </p:spPr>
+        <p:style>
+          <a:lnRef idx="1">
+            <a:schemeClr val="accent1"/>
+          </a:lnRef>
+          <a:fillRef idx="0">
+            <a:schemeClr val="accent1"/>
+          </a:fillRef>
+          <a:effectRef idx="0">
+            <a:schemeClr val="accent1"/>
+          </a:effectRef>
+          <a:fontRef idx="minor">
+            <a:schemeClr val="tx1"/>
+          </a:fontRef>
+        </p:style>
+      </p:cxnSp>
+      <p:cxnSp>
+        <p:nvCxnSpPr>
+          <p:cNvPr id="8" name="Straight Connector 7">
+            <a:extLst>
+              <a:ext uri="{FF2B5EF4-FFF2-40B4-BE49-F238E27FC236}">
+                <a16:creationId xmlns:a16="http://schemas.microsoft.com/office/drawing/2014/main" id="{BC321845-6836-F74F-8609-F9B5191C7B4B}"/>
+              </a:ext>
+            </a:extLst>
+          </p:cNvPr>
+          <p:cNvCxnSpPr>
+            <a:cxnSpLocks/>
+          </p:cNvCxnSpPr>
+          <p:nvPr/>
+        </p:nvCxnSpPr>
+        <p:spPr>
+          <a:xfrm>
+            <a:off x="560388" y="5828314"/>
+            <a:ext cx="2745889" cy="0"/>
+          </a:xfrm>
+          <a:prstGeom prst="line">
+            <a:avLst/>
+          </a:prstGeom>
+          <a:ln w="63500" cap="rnd">
+            <a:solidFill>
+              <a:schemeClr val="tx1"/>
+            </a:solidFill>
+          </a:ln>
+        </p:spPr>
+        <p:style>
+          <a:lnRef idx="1">
+            <a:schemeClr val="accent1"/>
+          </a:lnRef>
+          <a:fillRef idx="0">
+            <a:schemeClr val="accent1"/>
+          </a:fillRef>
+          <a:effectRef idx="0">
+            <a:schemeClr val="accent1"/>
+          </a:effectRef>
+          <a:fontRef idx="minor">
+            <a:schemeClr val="tx1"/>
+          </a:fontRef>
+        </p:style>
+      </p:cxnSp>
+      <p:cxnSp>
+        <p:nvCxnSpPr>
+          <p:cNvPr id="9" name="Straight Connector 8">
+            <a:extLst>
+              <a:ext uri="{FF2B5EF4-FFF2-40B4-BE49-F238E27FC236}">
+                <a16:creationId xmlns:a16="http://schemas.microsoft.com/office/drawing/2014/main" id="{61712B53-CF29-DE4A-AEC0-58D5AC5F4B44}"/>
+              </a:ext>
+            </a:extLst>
+          </p:cNvPr>
+          <p:cNvCxnSpPr>
+            <a:cxnSpLocks/>
+          </p:cNvCxnSpPr>
+          <p:nvPr/>
+        </p:nvCxnSpPr>
+        <p:spPr>
+          <a:xfrm flipV="1">
+            <a:off x="3306276" y="3999514"/>
+            <a:ext cx="1" cy="1828800"/>
+          </a:xfrm>
+          <a:prstGeom prst="line">
+            <a:avLst/>
+          </a:prstGeom>
+          <a:ln w="63500" cap="rnd">
+            <a:solidFill>
+              <a:schemeClr val="tx1"/>
+            </a:solidFill>
+            <a:bevel/>
+          </a:ln>
+        </p:spPr>
+        <p:style>
+          <a:lnRef idx="1">
+            <a:schemeClr val="accent1"/>
+          </a:lnRef>
+          <a:fillRef idx="0">
+            <a:schemeClr val="accent1"/>
+          </a:fillRef>
+          <a:effectRef idx="0">
+            <a:schemeClr val="accent1"/>
+          </a:effectRef>
+          <a:fontRef idx="minor">
+            <a:schemeClr val="tx1"/>
+          </a:fontRef>
+        </p:style>
+      </p:cxnSp>
+      <p:cxnSp>
+        <p:nvCxnSpPr>
+          <p:cNvPr id="10" name="Straight Connector 9">
+            <a:extLst>
+              <a:ext uri="{FF2B5EF4-FFF2-40B4-BE49-F238E27FC236}">
+                <a16:creationId xmlns:a16="http://schemas.microsoft.com/office/drawing/2014/main" id="{0A9E5ED7-E73E-EF41-A118-6A572E6B80A3}"/>
+              </a:ext>
+            </a:extLst>
+          </p:cNvPr>
+          <p:cNvCxnSpPr>
+            <a:cxnSpLocks/>
+          </p:cNvCxnSpPr>
+          <p:nvPr/>
+        </p:nvCxnSpPr>
+        <p:spPr>
+          <a:xfrm flipV="1">
+            <a:off x="560387" y="3999514"/>
+            <a:ext cx="1" cy="1828800"/>
+          </a:xfrm>
+          <a:prstGeom prst="line">
+            <a:avLst/>
+          </a:prstGeom>
+          <a:ln w="63500" cap="rnd">
+            <a:solidFill>
+              <a:schemeClr val="tx1"/>
+            </a:solidFill>
+          </a:ln>
+        </p:spPr>
+        <p:style>
+          <a:lnRef idx="1">
+            <a:schemeClr val="accent1"/>
+          </a:lnRef>
+          <a:fillRef idx="0">
+            <a:schemeClr val="accent1"/>
+          </a:fillRef>
+          <a:effectRef idx="0">
+            <a:schemeClr val="accent1"/>
+          </a:effectRef>
+          <a:fontRef idx="minor">
+            <a:schemeClr val="tx1"/>
+          </a:fontRef>
+        </p:style>
+      </p:cxnSp>
+    </p:spTree>
+    <p:extLst>
+      <p:ext uri="{BB962C8B-B14F-4D97-AF65-F5344CB8AC3E}">
+        <p14:creationId xmlns:p14="http://schemas.microsoft.com/office/powerpoint/2010/main" val="1763134952"/>
       </p:ext>
     </p:extLst>
   </p:cSld>

</xml_diff>